<commit_message>
Added images to presentation
</commit_message>
<xml_diff>
--- a/Documents/Presentation2.pptx
+++ b/Documents/Presentation2.pptx
@@ -109,6 +109,11 @@
       </a:defRPr>
     </a:lvl9pPr>
   </p:defaultTextStyle>
+  <p:extLst>
+    <p:ext uri="{EFAFB233-063F-42B5-8137-9DF3F51BA10A}">
+      <p15:sldGuideLst xmlns:p15="http://schemas.microsoft.com/office/powerpoint/2012/main"/>
+    </p:ext>
+  </p:extLst>
 </p:presentation>
 </file>
 
@@ -259,7 +264,7 @@
           <a:p>
             <a:fld id="{89AE1D72-7A6A-47B4-9A78-EB81D39A5452}" type="datetimeFigureOut">
               <a:rPr lang="en-US" smtClean="0"/>
-              <a:t>4/6/2019</a:t>
+              <a:t>4/7/2019</a:t>
             </a:fld>
             <a:endParaRPr lang="en-US"/>
           </a:p>
@@ -457,7 +462,7 @@
           <a:p>
             <a:fld id="{89AE1D72-7A6A-47B4-9A78-EB81D39A5452}" type="datetimeFigureOut">
               <a:rPr lang="en-US" smtClean="0"/>
-              <a:t>4/6/2019</a:t>
+              <a:t>4/7/2019</a:t>
             </a:fld>
             <a:endParaRPr lang="en-US"/>
           </a:p>
@@ -665,7 +670,7 @@
           <a:p>
             <a:fld id="{89AE1D72-7A6A-47B4-9A78-EB81D39A5452}" type="datetimeFigureOut">
               <a:rPr lang="en-US" smtClean="0"/>
-              <a:t>4/6/2019</a:t>
+              <a:t>4/7/2019</a:t>
             </a:fld>
             <a:endParaRPr lang="en-US"/>
           </a:p>
@@ -863,7 +868,7 @@
           <a:p>
             <a:fld id="{89AE1D72-7A6A-47B4-9A78-EB81D39A5452}" type="datetimeFigureOut">
               <a:rPr lang="en-US" smtClean="0"/>
-              <a:t>4/6/2019</a:t>
+              <a:t>4/7/2019</a:t>
             </a:fld>
             <a:endParaRPr lang="en-US"/>
           </a:p>
@@ -1138,7 +1143,7 @@
           <a:p>
             <a:fld id="{89AE1D72-7A6A-47B4-9A78-EB81D39A5452}" type="datetimeFigureOut">
               <a:rPr lang="en-US" smtClean="0"/>
-              <a:t>4/6/2019</a:t>
+              <a:t>4/7/2019</a:t>
             </a:fld>
             <a:endParaRPr lang="en-US"/>
           </a:p>
@@ -1403,7 +1408,7 @@
           <a:p>
             <a:fld id="{89AE1D72-7A6A-47B4-9A78-EB81D39A5452}" type="datetimeFigureOut">
               <a:rPr lang="en-US" smtClean="0"/>
-              <a:t>4/6/2019</a:t>
+              <a:t>4/7/2019</a:t>
             </a:fld>
             <a:endParaRPr lang="en-US"/>
           </a:p>
@@ -1815,7 +1820,7 @@
           <a:p>
             <a:fld id="{89AE1D72-7A6A-47B4-9A78-EB81D39A5452}" type="datetimeFigureOut">
               <a:rPr lang="en-US" smtClean="0"/>
-              <a:t>4/6/2019</a:t>
+              <a:t>4/7/2019</a:t>
             </a:fld>
             <a:endParaRPr lang="en-US"/>
           </a:p>
@@ -1956,7 +1961,7 @@
           <a:p>
             <a:fld id="{89AE1D72-7A6A-47B4-9A78-EB81D39A5452}" type="datetimeFigureOut">
               <a:rPr lang="en-US" smtClean="0"/>
-              <a:t>4/6/2019</a:t>
+              <a:t>4/7/2019</a:t>
             </a:fld>
             <a:endParaRPr lang="en-US"/>
           </a:p>
@@ -2069,7 +2074,7 @@
           <a:p>
             <a:fld id="{89AE1D72-7A6A-47B4-9A78-EB81D39A5452}" type="datetimeFigureOut">
               <a:rPr lang="en-US" smtClean="0"/>
-              <a:t>4/6/2019</a:t>
+              <a:t>4/7/2019</a:t>
             </a:fld>
             <a:endParaRPr lang="en-US"/>
           </a:p>
@@ -2380,7 +2385,7 @@
           <a:p>
             <a:fld id="{89AE1D72-7A6A-47B4-9A78-EB81D39A5452}" type="datetimeFigureOut">
               <a:rPr lang="en-US" smtClean="0"/>
-              <a:t>4/6/2019</a:t>
+              <a:t>4/7/2019</a:t>
             </a:fld>
             <a:endParaRPr lang="en-US"/>
           </a:p>
@@ -2668,7 +2673,7 @@
           <a:p>
             <a:fld id="{89AE1D72-7A6A-47B4-9A78-EB81D39A5452}" type="datetimeFigureOut">
               <a:rPr lang="en-US" smtClean="0"/>
-              <a:t>4/6/2019</a:t>
+              <a:t>4/7/2019</a:t>
             </a:fld>
             <a:endParaRPr lang="en-US"/>
           </a:p>
@@ -2909,7 +2914,7 @@
           <a:p>
             <a:fld id="{89AE1D72-7A6A-47B4-9A78-EB81D39A5452}" type="datetimeFigureOut">
               <a:rPr lang="en-US" smtClean="0"/>
-              <a:t>4/6/2019</a:t>
+              <a:t>4/7/2019</a:t>
             </a:fld>
             <a:endParaRPr lang="en-US"/>
           </a:p>
@@ -3766,6 +3771,42 @@
           </a:p>
         </p:txBody>
       </p:sp>
+      <p:pic>
+        <p:nvPicPr>
+          <p:cNvPr id="5" name="Picture 4">
+            <a:extLst>
+              <a:ext uri="{FF2B5EF4-FFF2-40B4-BE49-F238E27FC236}">
+                <a16:creationId xmlns:a16="http://schemas.microsoft.com/office/drawing/2014/main" id="{4A6B41F3-E14D-4E32-ADA7-125F5FBAB4DD}"/>
+              </a:ext>
+            </a:extLst>
+          </p:cNvPr>
+          <p:cNvPicPr>
+            <a:picLocks noChangeAspect="1"/>
+          </p:cNvPicPr>
+          <p:nvPr/>
+        </p:nvPicPr>
+        <p:blipFill>
+          <a:blip r:embed="rId2">
+            <a:extLst>
+              <a:ext uri="{28A0092B-C50C-407E-A947-70E740481C1C}">
+                <a14:useLocalDpi xmlns:a14="http://schemas.microsoft.com/office/drawing/2010/main" val="0"/>
+              </a:ext>
+            </a:extLst>
+          </a:blip>
+          <a:stretch>
+            <a:fillRect/>
+          </a:stretch>
+        </p:blipFill>
+        <p:spPr>
+          <a:xfrm>
+            <a:off x="7432645" y="4131331"/>
+            <a:ext cx="3414320" cy="2560740"/>
+          </a:xfrm>
+          <a:prstGeom prst="rect">
+            <a:avLst/>
+          </a:prstGeom>
+        </p:spPr>
+      </p:pic>
     </p:spTree>
     <p:extLst>
       <p:ext uri="{BB962C8B-B14F-4D97-AF65-F5344CB8AC3E}">
@@ -4208,6 +4249,36 @@
           </a:p>
         </p:txBody>
       </p:sp>
+      <p:pic>
+        <p:nvPicPr>
+          <p:cNvPr id="6" name="Picture 5">
+            <a:extLst>
+              <a:ext uri="{FF2B5EF4-FFF2-40B4-BE49-F238E27FC236}">
+                <a16:creationId xmlns:a16="http://schemas.microsoft.com/office/drawing/2014/main" id="{BC743B5A-23A4-4972-A723-B8C103CCCE72}"/>
+              </a:ext>
+            </a:extLst>
+          </p:cNvPr>
+          <p:cNvPicPr>
+            <a:picLocks noChangeAspect="1"/>
+          </p:cNvPicPr>
+          <p:nvPr/>
+        </p:nvPicPr>
+        <p:blipFill>
+          <a:blip r:embed="rId2"/>
+          <a:stretch>
+            <a:fillRect/>
+          </a:stretch>
+        </p:blipFill>
+        <p:spPr>
+          <a:xfrm>
+            <a:off x="6854892" y="3950500"/>
+            <a:ext cx="2907500" cy="2907500"/>
+          </a:xfrm>
+          <a:prstGeom prst="rect">
+            <a:avLst/>
+          </a:prstGeom>
+        </p:spPr>
+      </p:pic>
     </p:spTree>
     <p:extLst>
       <p:ext uri="{BB962C8B-B14F-4D97-AF65-F5344CB8AC3E}">
@@ -4631,6 +4702,114 @@
           </a:p>
         </p:txBody>
       </p:sp>
+      <p:pic>
+        <p:nvPicPr>
+          <p:cNvPr id="7" name="Picture 6">
+            <a:extLst>
+              <a:ext uri="{FF2B5EF4-FFF2-40B4-BE49-F238E27FC236}">
+                <a16:creationId xmlns:a16="http://schemas.microsoft.com/office/drawing/2014/main" id="{6001AA04-C5AC-487B-AE01-50E321AB39FC}"/>
+              </a:ext>
+            </a:extLst>
+          </p:cNvPr>
+          <p:cNvPicPr>
+            <a:picLocks noChangeAspect="1"/>
+          </p:cNvPicPr>
+          <p:nvPr/>
+        </p:nvPicPr>
+        <p:blipFill>
+          <a:blip r:embed="rId2">
+            <a:extLst>
+              <a:ext uri="{28A0092B-C50C-407E-A947-70E740481C1C}">
+                <a14:useLocalDpi xmlns:a14="http://schemas.microsoft.com/office/drawing/2010/main" val="0"/>
+              </a:ext>
+            </a:extLst>
+          </a:blip>
+          <a:stretch>
+            <a:fillRect/>
+          </a:stretch>
+        </p:blipFill>
+        <p:spPr>
+          <a:xfrm>
+            <a:off x="9714066" y="5048760"/>
+            <a:ext cx="1761688" cy="1761688"/>
+          </a:xfrm>
+          <a:prstGeom prst="rect">
+            <a:avLst/>
+          </a:prstGeom>
+        </p:spPr>
+      </p:pic>
+      <p:pic>
+        <p:nvPicPr>
+          <p:cNvPr id="9" name="Picture 8">
+            <a:extLst>
+              <a:ext uri="{FF2B5EF4-FFF2-40B4-BE49-F238E27FC236}">
+                <a16:creationId xmlns:a16="http://schemas.microsoft.com/office/drawing/2014/main" id="{A8D39D51-EE71-4A67-A593-21DF6D07D349}"/>
+              </a:ext>
+            </a:extLst>
+          </p:cNvPr>
+          <p:cNvPicPr>
+            <a:picLocks noChangeAspect="1"/>
+          </p:cNvPicPr>
+          <p:nvPr/>
+        </p:nvPicPr>
+        <p:blipFill>
+          <a:blip r:embed="rId3">
+            <a:extLst>
+              <a:ext uri="{28A0092B-C50C-407E-A947-70E740481C1C}">
+                <a14:useLocalDpi xmlns:a14="http://schemas.microsoft.com/office/drawing/2010/main" val="0"/>
+              </a:ext>
+            </a:extLst>
+          </a:blip>
+          <a:stretch>
+            <a:fillRect/>
+          </a:stretch>
+        </p:blipFill>
+        <p:spPr>
+          <a:xfrm>
+            <a:off x="7952378" y="4910342"/>
+            <a:ext cx="1761688" cy="1761688"/>
+          </a:xfrm>
+          <a:prstGeom prst="rect">
+            <a:avLst/>
+          </a:prstGeom>
+        </p:spPr>
+      </p:pic>
+      <p:pic>
+        <p:nvPicPr>
+          <p:cNvPr id="11" name="Picture 10">
+            <a:extLst>
+              <a:ext uri="{FF2B5EF4-FFF2-40B4-BE49-F238E27FC236}">
+                <a16:creationId xmlns:a16="http://schemas.microsoft.com/office/drawing/2014/main" id="{46812433-1D53-402B-BD5A-EA80D3D84D88}"/>
+              </a:ext>
+            </a:extLst>
+          </p:cNvPr>
+          <p:cNvPicPr>
+            <a:picLocks noChangeAspect="1"/>
+          </p:cNvPicPr>
+          <p:nvPr/>
+        </p:nvPicPr>
+        <p:blipFill>
+          <a:blip r:embed="rId4">
+            <a:extLst>
+              <a:ext uri="{28A0092B-C50C-407E-A947-70E740481C1C}">
+                <a14:useLocalDpi xmlns:a14="http://schemas.microsoft.com/office/drawing/2010/main" val="0"/>
+              </a:ext>
+            </a:extLst>
+          </a:blip>
+          <a:stretch>
+            <a:fillRect/>
+          </a:stretch>
+        </p:blipFill>
+        <p:spPr>
+          <a:xfrm>
+            <a:off x="6203938" y="4910342"/>
+            <a:ext cx="1761687" cy="1761687"/>
+          </a:xfrm>
+          <a:prstGeom prst="rect">
+            <a:avLst/>
+          </a:prstGeom>
+        </p:spPr>
+      </p:pic>
     </p:spTree>
     <p:extLst>
       <p:ext uri="{BB962C8B-B14F-4D97-AF65-F5344CB8AC3E}">

</xml_diff>